<commit_message>
Add Rules & Help Text
</commit_message>
<xml_diff>
--- a/Documentation & Presentation/Presentation_2_1.pptx
+++ b/Documentation & Presentation/Presentation_2_1.pptx
@@ -213,7 +213,7 @@
           <a:p>
             <a:fld id="{AE7BA408-30A0-47BD-BF99-8E76EC319113}" type="datetimeFigureOut">
               <a:rPr lang="bg-BG" smtClean="0"/>
-              <a:t>15.5.2022 г.</a:t>
+              <a:t>16.5.2022 г.</a:t>
             </a:fld>
             <a:endParaRPr lang="bg-BG"/>
           </a:p>
@@ -1254,7 +1254,7 @@
           <a:p>
             <a:fld id="{96A54FD2-9807-47AE-B332-82BE46C02019}" type="datetimeFigureOut">
               <a:rPr lang="bg-BG" smtClean="0"/>
-              <a:t>15.5.2022 г.</a:t>
+              <a:t>16.5.2022 г.</a:t>
             </a:fld>
             <a:endParaRPr lang="bg-BG"/>
           </a:p>
@@ -1454,7 +1454,7 @@
           <a:p>
             <a:fld id="{96A54FD2-9807-47AE-B332-82BE46C02019}" type="datetimeFigureOut">
               <a:rPr lang="bg-BG" smtClean="0"/>
-              <a:t>15.5.2022 г.</a:t>
+              <a:t>16.5.2022 г.</a:t>
             </a:fld>
             <a:endParaRPr lang="bg-BG"/>
           </a:p>
@@ -1664,7 +1664,7 @@
           <a:p>
             <a:fld id="{96A54FD2-9807-47AE-B332-82BE46C02019}" type="datetimeFigureOut">
               <a:rPr lang="bg-BG" smtClean="0"/>
-              <a:t>15.5.2022 г.</a:t>
+              <a:t>16.5.2022 г.</a:t>
             </a:fld>
             <a:endParaRPr lang="bg-BG"/>
           </a:p>
@@ -10021,7 +10021,7 @@
           <a:p>
             <a:fld id="{96A54FD2-9807-47AE-B332-82BE46C02019}" type="datetimeFigureOut">
               <a:rPr lang="bg-BG" smtClean="0"/>
-              <a:t>15.5.2022 г.</a:t>
+              <a:t>16.5.2022 г.</a:t>
             </a:fld>
             <a:endParaRPr lang="bg-BG"/>
           </a:p>
@@ -10297,7 +10297,7 @@
           <a:p>
             <a:fld id="{96A54FD2-9807-47AE-B332-82BE46C02019}" type="datetimeFigureOut">
               <a:rPr lang="bg-BG" smtClean="0"/>
-              <a:t>15.5.2022 г.</a:t>
+              <a:t>16.5.2022 г.</a:t>
             </a:fld>
             <a:endParaRPr lang="bg-BG"/>
           </a:p>
@@ -10565,7 +10565,7 @@
           <a:p>
             <a:fld id="{96A54FD2-9807-47AE-B332-82BE46C02019}" type="datetimeFigureOut">
               <a:rPr lang="bg-BG" smtClean="0"/>
-              <a:t>15.5.2022 г.</a:t>
+              <a:t>16.5.2022 г.</a:t>
             </a:fld>
             <a:endParaRPr lang="bg-BG"/>
           </a:p>
@@ -10980,7 +10980,7 @@
           <a:p>
             <a:fld id="{96A54FD2-9807-47AE-B332-82BE46C02019}" type="datetimeFigureOut">
               <a:rPr lang="bg-BG" smtClean="0"/>
-              <a:t>15.5.2022 г.</a:t>
+              <a:t>16.5.2022 г.</a:t>
             </a:fld>
             <a:endParaRPr lang="bg-BG"/>
           </a:p>
@@ -11122,7 +11122,7 @@
           <a:p>
             <a:fld id="{96A54FD2-9807-47AE-B332-82BE46C02019}" type="datetimeFigureOut">
               <a:rPr lang="bg-BG" smtClean="0"/>
-              <a:t>15.5.2022 г.</a:t>
+              <a:t>16.5.2022 г.</a:t>
             </a:fld>
             <a:endParaRPr lang="bg-BG"/>
           </a:p>
@@ -11235,7 +11235,7 @@
           <a:p>
             <a:fld id="{96A54FD2-9807-47AE-B332-82BE46C02019}" type="datetimeFigureOut">
               <a:rPr lang="bg-BG" smtClean="0"/>
-              <a:t>15.5.2022 г.</a:t>
+              <a:t>16.5.2022 г.</a:t>
             </a:fld>
             <a:endParaRPr lang="bg-BG"/>
           </a:p>
@@ -11548,7 +11548,7 @@
           <a:p>
             <a:fld id="{96A54FD2-9807-47AE-B332-82BE46C02019}" type="datetimeFigureOut">
               <a:rPr lang="bg-BG" smtClean="0"/>
-              <a:t>15.5.2022 г.</a:t>
+              <a:t>16.5.2022 г.</a:t>
             </a:fld>
             <a:endParaRPr lang="bg-BG"/>
           </a:p>
@@ -11837,7 +11837,7 @@
           <a:p>
             <a:fld id="{96A54FD2-9807-47AE-B332-82BE46C02019}" type="datetimeFigureOut">
               <a:rPr lang="bg-BG" smtClean="0"/>
-              <a:t>15.5.2022 г.</a:t>
+              <a:t>16.5.2022 г.</a:t>
             </a:fld>
             <a:endParaRPr lang="bg-BG"/>
           </a:p>
@@ -12080,7 +12080,7 @@
           <a:p>
             <a:fld id="{96A54FD2-9807-47AE-B332-82BE46C02019}" type="datetimeFigureOut">
               <a:rPr lang="bg-BG" smtClean="0"/>
-              <a:t>15.5.2022 г.</a:t>
+              <a:t>16.5.2022 г.</a:t>
             </a:fld>
             <a:endParaRPr lang="bg-BG"/>
           </a:p>
@@ -12749,6 +12749,18 @@
               </a:rPr>
               <a:t>Kliment Tenev – QA Engineer</a:t>
             </a:r>
+            <a:r>
+              <a:rPr lang="en" sz="3850" b="1" i="1" dirty="0">
+                <a:solidFill>
+                  <a:schemeClr val="tx2">
+                    <a:lumMod val="75000"/>
+                  </a:schemeClr>
+                </a:solidFill>
+                <a:ea typeface="Calibri"/>
+                <a:cs typeface="Calibri"/>
+              </a:rPr>
+              <a:t/>
+            </a:r>
             <a:br>
               <a:rPr lang="en" sz="3850" b="1" i="1" dirty="0">
                 <a:solidFill>
@@ -13243,7 +13255,40 @@
                 </a:solidFill>
                 <a:latin typeface="Bahnschrift"/>
               </a:rPr>
-              <a:t> logic easier with our game and keep b00li0's legacy alive.</a:t>
+              <a:t> logic easier with our game and </a:t>
+            </a:r>
+            <a:r>
+              <a:rPr lang="en" sz="2100">
+                <a:solidFill>
+                  <a:schemeClr val="tx2">
+                    <a:lumMod val="75000"/>
+                  </a:schemeClr>
+                </a:solidFill>
+                <a:latin typeface="Bahnschrift"/>
+              </a:rPr>
+              <a:t>keep </a:t>
+            </a:r>
+            <a:r>
+              <a:rPr lang="en" sz="2100" smtClean="0">
+                <a:solidFill>
+                  <a:schemeClr val="tx2">
+                    <a:lumMod val="75000"/>
+                  </a:schemeClr>
+                </a:solidFill>
+                <a:latin typeface="Bahnschrift"/>
+              </a:rPr>
+              <a:t>b00le0's </a:t>
+            </a:r>
+            <a:r>
+              <a:rPr lang="en" sz="2100" dirty="0">
+                <a:solidFill>
+                  <a:schemeClr val="tx2">
+                    <a:lumMod val="75000"/>
+                  </a:schemeClr>
+                </a:solidFill>
+                <a:latin typeface="Bahnschrift"/>
+              </a:rPr>
+              <a:t>legacy alive.</a:t>
             </a:r>
           </a:p>
         </p:txBody>

</xml_diff>